<commit_message>
Add the Regression sample
</commit_message>
<xml_diff>
--- a/AIforWeather_ch04.pptx
+++ b/AIforWeather_ch04.pptx
@@ -18,7 +18,9 @@
     <p:sldId id="266" r:id="rId12"/>
     <p:sldId id="268" r:id="rId13"/>
     <p:sldId id="269" r:id="rId14"/>
-    <p:sldId id="271" r:id="rId15"/>
+    <p:sldId id="272" r:id="rId15"/>
+    <p:sldId id="271" r:id="rId16"/>
+    <p:sldId id="273" r:id="rId17"/>
   </p:sldIdLst>
   <p:sldSz cx="12192000" cy="6858000"/>
   <p:notesSz cx="6858000" cy="9144000"/>
@@ -272,7 +274,7 @@
           <a:p>
             <a:fld id="{6EE04F4A-B5C1-4345-B5CE-E28444E9CB8C}" type="datetimeFigureOut">
               <a:rPr lang="zh-TW" altLang="en-US" smtClean="0"/>
-              <a:t>2022/3/23</a:t>
+              <a:t>2022/3/28</a:t>
             </a:fld>
             <a:endParaRPr lang="zh-TW" altLang="en-US"/>
           </a:p>
@@ -470,7 +472,7 @@
           <a:p>
             <a:fld id="{6EE04F4A-B5C1-4345-B5CE-E28444E9CB8C}" type="datetimeFigureOut">
               <a:rPr lang="zh-TW" altLang="en-US" smtClean="0"/>
-              <a:t>2022/3/23</a:t>
+              <a:t>2022/3/28</a:t>
             </a:fld>
             <a:endParaRPr lang="zh-TW" altLang="en-US"/>
           </a:p>
@@ -678,7 +680,7 @@
           <a:p>
             <a:fld id="{6EE04F4A-B5C1-4345-B5CE-E28444E9CB8C}" type="datetimeFigureOut">
               <a:rPr lang="zh-TW" altLang="en-US" smtClean="0"/>
-              <a:t>2022/3/23</a:t>
+              <a:t>2022/3/28</a:t>
             </a:fld>
             <a:endParaRPr lang="zh-TW" altLang="en-US"/>
           </a:p>
@@ -927,7 +929,7 @@
           <a:p>
             <a:fld id="{6EE04F4A-B5C1-4345-B5CE-E28444E9CB8C}" type="datetimeFigureOut">
               <a:rPr lang="zh-TW" altLang="en-US" smtClean="0"/>
-              <a:t>2022/3/23</a:t>
+              <a:t>2022/3/28</a:t>
             </a:fld>
             <a:endParaRPr lang="zh-TW" altLang="en-US"/>
           </a:p>
@@ -1202,7 +1204,7 @@
           <a:p>
             <a:fld id="{6EE04F4A-B5C1-4345-B5CE-E28444E9CB8C}" type="datetimeFigureOut">
               <a:rPr lang="zh-TW" altLang="en-US" smtClean="0"/>
-              <a:t>2022/3/23</a:t>
+              <a:t>2022/3/28</a:t>
             </a:fld>
             <a:endParaRPr lang="zh-TW" altLang="en-US"/>
           </a:p>
@@ -1467,7 +1469,7 @@
           <a:p>
             <a:fld id="{6EE04F4A-B5C1-4345-B5CE-E28444E9CB8C}" type="datetimeFigureOut">
               <a:rPr lang="zh-TW" altLang="en-US" smtClean="0"/>
-              <a:t>2022/3/23</a:t>
+              <a:t>2022/3/28</a:t>
             </a:fld>
             <a:endParaRPr lang="zh-TW" altLang="en-US"/>
           </a:p>
@@ -1879,7 +1881,7 @@
           <a:p>
             <a:fld id="{6EE04F4A-B5C1-4345-B5CE-E28444E9CB8C}" type="datetimeFigureOut">
               <a:rPr lang="zh-TW" altLang="en-US" smtClean="0"/>
-              <a:t>2022/3/23</a:t>
+              <a:t>2022/3/28</a:t>
             </a:fld>
             <a:endParaRPr lang="zh-TW" altLang="en-US"/>
           </a:p>
@@ -2020,7 +2022,7 @@
           <a:p>
             <a:fld id="{6EE04F4A-B5C1-4345-B5CE-E28444E9CB8C}" type="datetimeFigureOut">
               <a:rPr lang="zh-TW" altLang="en-US" smtClean="0"/>
-              <a:t>2022/3/23</a:t>
+              <a:t>2022/3/28</a:t>
             </a:fld>
             <a:endParaRPr lang="zh-TW" altLang="en-US"/>
           </a:p>
@@ -2133,7 +2135,7 @@
           <a:p>
             <a:fld id="{6EE04F4A-B5C1-4345-B5CE-E28444E9CB8C}" type="datetimeFigureOut">
               <a:rPr lang="zh-TW" altLang="en-US" smtClean="0"/>
-              <a:t>2022/3/23</a:t>
+              <a:t>2022/3/28</a:t>
             </a:fld>
             <a:endParaRPr lang="zh-TW" altLang="en-US"/>
           </a:p>
@@ -2444,7 +2446,7 @@
           <a:p>
             <a:fld id="{6EE04F4A-B5C1-4345-B5CE-E28444E9CB8C}" type="datetimeFigureOut">
               <a:rPr lang="zh-TW" altLang="en-US" smtClean="0"/>
-              <a:t>2022/3/23</a:t>
+              <a:t>2022/3/28</a:t>
             </a:fld>
             <a:endParaRPr lang="zh-TW" altLang="en-US"/>
           </a:p>
@@ -2732,7 +2734,7 @@
           <a:p>
             <a:fld id="{6EE04F4A-B5C1-4345-B5CE-E28444E9CB8C}" type="datetimeFigureOut">
               <a:rPr lang="zh-TW" altLang="en-US" smtClean="0"/>
-              <a:t>2022/3/23</a:t>
+              <a:t>2022/3/28</a:t>
             </a:fld>
             <a:endParaRPr lang="zh-TW" altLang="en-US"/>
           </a:p>
@@ -2998,7 +3000,7 @@
           <a:p>
             <a:fld id="{6EE04F4A-B5C1-4345-B5CE-E28444E9CB8C}" type="datetimeFigureOut">
               <a:rPr lang="zh-TW" altLang="en-US" smtClean="0"/>
-              <a:t>2022/3/23</a:t>
+              <a:t>2022/3/28</a:t>
             </a:fld>
             <a:endParaRPr lang="zh-TW" altLang="en-US"/>
           </a:p>
@@ -14196,6 +14198,520 @@
       </p:grpSpPr>
       <p:sp>
         <p:nvSpPr>
+          <p:cNvPr id="2" name="標題 1"/>
+          <p:cNvSpPr>
+            <a:spLocks noGrp="1"/>
+          </p:cNvSpPr>
+          <p:nvPr>
+            <p:ph type="title"/>
+          </p:nvPr>
+        </p:nvSpPr>
+        <p:spPr/>
+        <p:txBody>
+          <a:bodyPr>
+            <a:normAutofit fontScale="90000"/>
+          </a:bodyPr>
+          <a:lstStyle/>
+          <a:p>
+            <a:r>
+              <a:rPr lang="zh-TW" altLang="en-US" dirty="0" smtClean="0"/>
+              <a:t>程式流程</a:t>
+            </a:r>
+            <a:endParaRPr lang="zh-TW" altLang="en-US" dirty="0"/>
+          </a:p>
+        </p:txBody>
+      </p:sp>
+      <p:sp>
+        <p:nvSpPr>
+          <p:cNvPr id="4" name="矩形 3">
+            <a:extLst>
+              <a:ext uri="{FF2B5EF4-FFF2-40B4-BE49-F238E27FC236}">
+                <a16:creationId xmlns:a16="http://schemas.microsoft.com/office/drawing/2014/main" id="{6F652E99-263A-4D97-B66D-1B7039C57BA2}"/>
+              </a:ext>
+            </a:extLst>
+          </p:cNvPr>
+          <p:cNvSpPr/>
+          <p:nvPr/>
+        </p:nvSpPr>
+        <p:spPr>
+          <a:xfrm>
+            <a:off x="757282" y="872834"/>
+            <a:ext cx="2210362" cy="606829"/>
+          </a:xfrm>
+          <a:prstGeom prst="rect">
+            <a:avLst/>
+          </a:prstGeom>
+          <a:solidFill>
+            <a:schemeClr val="accent4">
+              <a:lumMod val="50000"/>
+            </a:schemeClr>
+          </a:solidFill>
+          <a:ln>
+            <a:noFill/>
+          </a:ln>
+        </p:spPr>
+        <p:style>
+          <a:lnRef idx="2">
+            <a:schemeClr val="accent1">
+              <a:shade val="50000"/>
+            </a:schemeClr>
+          </a:lnRef>
+          <a:fillRef idx="1">
+            <a:schemeClr val="accent1"/>
+          </a:fillRef>
+          <a:effectRef idx="0">
+            <a:schemeClr val="accent1"/>
+          </a:effectRef>
+          <a:fontRef idx="minor">
+            <a:schemeClr val="lt1"/>
+          </a:fontRef>
+        </p:style>
+        <p:txBody>
+          <a:bodyPr rtlCol="0" anchor="ctr"/>
+          <a:lstStyle/>
+          <a:p>
+            <a:pPr algn="ctr"/>
+            <a:r>
+              <a:rPr lang="zh-TW" altLang="en-US" sz="2400" dirty="0" smtClean="0">
+                <a:latin typeface="Microsoft YaHei" panose="020B0503020204020204" pitchFamily="34" charset="-122"/>
+                <a:ea typeface="Microsoft YaHei" panose="020B0503020204020204" pitchFamily="34" charset="-122"/>
+              </a:rPr>
+              <a:t>引入原始資料</a:t>
+            </a:r>
+            <a:endParaRPr lang="zh-TW" altLang="en-US" sz="2400" dirty="0">
+              <a:latin typeface="Microsoft YaHei" panose="020B0503020204020204" pitchFamily="34" charset="-122"/>
+              <a:ea typeface="Microsoft YaHei" panose="020B0503020204020204" pitchFamily="34" charset="-122"/>
+            </a:endParaRPr>
+          </a:p>
+        </p:txBody>
+      </p:sp>
+      <p:sp>
+        <p:nvSpPr>
+          <p:cNvPr id="5" name="矩形 4">
+            <a:extLst>
+              <a:ext uri="{FF2B5EF4-FFF2-40B4-BE49-F238E27FC236}">
+                <a16:creationId xmlns:a16="http://schemas.microsoft.com/office/drawing/2014/main" id="{6F652E99-263A-4D97-B66D-1B7039C57BA2}"/>
+              </a:ext>
+            </a:extLst>
+          </p:cNvPr>
+          <p:cNvSpPr/>
+          <p:nvPr/>
+        </p:nvSpPr>
+        <p:spPr>
+          <a:xfrm>
+            <a:off x="1429101" y="2512517"/>
+            <a:ext cx="2964049" cy="606829"/>
+          </a:xfrm>
+          <a:prstGeom prst="rect">
+            <a:avLst/>
+          </a:prstGeom>
+          <a:solidFill>
+            <a:schemeClr val="accent4">
+              <a:lumMod val="50000"/>
+            </a:schemeClr>
+          </a:solidFill>
+          <a:ln>
+            <a:noFill/>
+          </a:ln>
+        </p:spPr>
+        <p:style>
+          <a:lnRef idx="2">
+            <a:schemeClr val="accent1">
+              <a:shade val="50000"/>
+            </a:schemeClr>
+          </a:lnRef>
+          <a:fillRef idx="1">
+            <a:schemeClr val="accent1"/>
+          </a:fillRef>
+          <a:effectRef idx="0">
+            <a:schemeClr val="accent1"/>
+          </a:effectRef>
+          <a:fontRef idx="minor">
+            <a:schemeClr val="lt1"/>
+          </a:fontRef>
+        </p:style>
+        <p:txBody>
+          <a:bodyPr rtlCol="0" anchor="ctr"/>
+          <a:lstStyle/>
+          <a:p>
+            <a:pPr algn="ctr"/>
+            <a:r>
+              <a:rPr lang="zh-TW" altLang="en-US" sz="2400" dirty="0">
+                <a:latin typeface="Microsoft YaHei" panose="020B0503020204020204" pitchFamily="34" charset="-122"/>
+                <a:ea typeface="Microsoft YaHei" panose="020B0503020204020204" pitchFamily="34" charset="-122"/>
+              </a:rPr>
+              <a:t>轉</a:t>
+            </a:r>
+            <a:r>
+              <a:rPr lang="zh-TW" altLang="en-US" sz="2400" dirty="0" smtClean="0">
+                <a:latin typeface="Microsoft YaHei" panose="020B0503020204020204" pitchFamily="34" charset="-122"/>
+                <a:ea typeface="Microsoft YaHei" panose="020B0503020204020204" pitchFamily="34" charset="-122"/>
+              </a:rPr>
+              <a:t>成</a:t>
+            </a:r>
+            <a:r>
+              <a:rPr lang="en-US" altLang="zh-TW" sz="2400" dirty="0" err="1" smtClean="0">
+                <a:latin typeface="Microsoft YaHei" panose="020B0503020204020204" pitchFamily="34" charset="-122"/>
+                <a:ea typeface="Microsoft YaHei" panose="020B0503020204020204" pitchFamily="34" charset="-122"/>
+              </a:rPr>
+              <a:t>Numpy</a:t>
+            </a:r>
+            <a:r>
+              <a:rPr lang="en-US" altLang="zh-TW" sz="2400" dirty="0" smtClean="0">
+                <a:latin typeface="Microsoft YaHei" panose="020B0503020204020204" pitchFamily="34" charset="-122"/>
+                <a:ea typeface="Microsoft YaHei" panose="020B0503020204020204" pitchFamily="34" charset="-122"/>
+              </a:rPr>
+              <a:t> array</a:t>
+            </a:r>
+            <a:endParaRPr lang="zh-TW" altLang="en-US" sz="2400" dirty="0">
+              <a:latin typeface="Microsoft YaHei" panose="020B0503020204020204" pitchFamily="34" charset="-122"/>
+              <a:ea typeface="Microsoft YaHei" panose="020B0503020204020204" pitchFamily="34" charset="-122"/>
+            </a:endParaRPr>
+          </a:p>
+        </p:txBody>
+      </p:sp>
+      <p:pic>
+        <p:nvPicPr>
+          <p:cNvPr id="6" name="圖片 5">
+            <a:extLst>
+              <a:ext uri="{FF2B5EF4-FFF2-40B4-BE49-F238E27FC236}">
+                <a16:creationId xmlns:a16="http://schemas.microsoft.com/office/drawing/2014/main" id="{FFFA430E-1DC6-4C7E-9D16-8E55193429DD}"/>
+              </a:ext>
+            </a:extLst>
+          </p:cNvPr>
+          <p:cNvPicPr>
+            <a:picLocks noChangeAspect="1"/>
+          </p:cNvPicPr>
+          <p:nvPr/>
+        </p:nvPicPr>
+        <p:blipFill>
+          <a:blip r:embed="rId2"/>
+          <a:stretch>
+            <a:fillRect/>
+          </a:stretch>
+        </p:blipFill>
+        <p:spPr>
+          <a:xfrm>
+            <a:off x="3394363" y="823706"/>
+            <a:ext cx="8179723" cy="705087"/>
+          </a:xfrm>
+          <a:prstGeom prst="rect">
+            <a:avLst/>
+          </a:prstGeom>
+        </p:spPr>
+      </p:pic>
+      <p:sp>
+        <p:nvSpPr>
+          <p:cNvPr id="7" name="向下箭號 6"/>
+          <p:cNvSpPr/>
+          <p:nvPr/>
+        </p:nvSpPr>
+        <p:spPr>
+          <a:xfrm rot="19757080">
+            <a:off x="2286000" y="1612663"/>
+            <a:ext cx="498764" cy="631773"/>
+          </a:xfrm>
+          <a:prstGeom prst="downArrow">
+            <a:avLst/>
+          </a:prstGeom>
+          <a:solidFill>
+            <a:schemeClr val="accent2">
+              <a:lumMod val="75000"/>
+            </a:schemeClr>
+          </a:solidFill>
+          <a:ln>
+            <a:noFill/>
+          </a:ln>
+        </p:spPr>
+        <p:style>
+          <a:lnRef idx="2">
+            <a:schemeClr val="accent1">
+              <a:shade val="50000"/>
+            </a:schemeClr>
+          </a:lnRef>
+          <a:fillRef idx="1">
+            <a:schemeClr val="accent1"/>
+          </a:fillRef>
+          <a:effectRef idx="0">
+            <a:schemeClr val="accent1"/>
+          </a:effectRef>
+          <a:fontRef idx="minor">
+            <a:schemeClr val="lt1"/>
+          </a:fontRef>
+        </p:style>
+        <p:txBody>
+          <a:bodyPr rtlCol="0" anchor="ctr"/>
+          <a:lstStyle/>
+          <a:p>
+            <a:pPr algn="ctr"/>
+            <a:endParaRPr lang="zh-TW" altLang="en-US"/>
+          </a:p>
+        </p:txBody>
+      </p:sp>
+      <p:sp>
+        <p:nvSpPr>
+          <p:cNvPr id="8" name="矩形 7">
+            <a:extLst>
+              <a:ext uri="{FF2B5EF4-FFF2-40B4-BE49-F238E27FC236}">
+                <a16:creationId xmlns:a16="http://schemas.microsoft.com/office/drawing/2014/main" id="{6F652E99-263A-4D97-B66D-1B7039C57BA2}"/>
+              </a:ext>
+            </a:extLst>
+          </p:cNvPr>
+          <p:cNvSpPr/>
+          <p:nvPr/>
+        </p:nvSpPr>
+        <p:spPr>
+          <a:xfrm>
+            <a:off x="3514336" y="4036571"/>
+            <a:ext cx="2964049" cy="606829"/>
+          </a:xfrm>
+          <a:prstGeom prst="rect">
+            <a:avLst/>
+          </a:prstGeom>
+          <a:solidFill>
+            <a:schemeClr val="accent4">
+              <a:lumMod val="50000"/>
+            </a:schemeClr>
+          </a:solidFill>
+          <a:ln>
+            <a:noFill/>
+          </a:ln>
+        </p:spPr>
+        <p:style>
+          <a:lnRef idx="2">
+            <a:schemeClr val="accent1">
+              <a:shade val="50000"/>
+            </a:schemeClr>
+          </a:lnRef>
+          <a:fillRef idx="1">
+            <a:schemeClr val="accent1"/>
+          </a:fillRef>
+          <a:effectRef idx="0">
+            <a:schemeClr val="accent1"/>
+          </a:effectRef>
+          <a:fontRef idx="minor">
+            <a:schemeClr val="lt1"/>
+          </a:fontRef>
+        </p:style>
+        <p:txBody>
+          <a:bodyPr rtlCol="0" anchor="ctr"/>
+          <a:lstStyle/>
+          <a:p>
+            <a:pPr algn="ctr"/>
+            <a:r>
+              <a:rPr lang="zh-TW" altLang="en-US" sz="2400" dirty="0" smtClean="0">
+                <a:latin typeface="Microsoft YaHei" panose="020B0503020204020204" pitchFamily="34" charset="-122"/>
+                <a:ea typeface="Microsoft YaHei" panose="020B0503020204020204" pitchFamily="34" charset="-122"/>
+              </a:rPr>
+              <a:t>分成測試</a:t>
+            </a:r>
+            <a:r>
+              <a:rPr lang="en-US" altLang="zh-TW" sz="2400" dirty="0" smtClean="0">
+                <a:latin typeface="Microsoft YaHei" panose="020B0503020204020204" pitchFamily="34" charset="-122"/>
+                <a:ea typeface="Microsoft YaHei" panose="020B0503020204020204" pitchFamily="34" charset="-122"/>
+              </a:rPr>
+              <a:t>/</a:t>
+            </a:r>
+            <a:r>
+              <a:rPr lang="zh-TW" altLang="en-US" sz="2400" dirty="0" smtClean="0">
+                <a:latin typeface="Microsoft YaHei" panose="020B0503020204020204" pitchFamily="34" charset="-122"/>
+                <a:ea typeface="Microsoft YaHei" panose="020B0503020204020204" pitchFamily="34" charset="-122"/>
+              </a:rPr>
+              <a:t>訓練資料</a:t>
+            </a:r>
+            <a:endParaRPr lang="zh-TW" altLang="en-US" sz="2400" dirty="0">
+              <a:latin typeface="Microsoft YaHei" panose="020B0503020204020204" pitchFamily="34" charset="-122"/>
+              <a:ea typeface="Microsoft YaHei" panose="020B0503020204020204" pitchFamily="34" charset="-122"/>
+            </a:endParaRPr>
+          </a:p>
+        </p:txBody>
+      </p:sp>
+      <p:sp>
+        <p:nvSpPr>
+          <p:cNvPr id="9" name="向下箭號 8"/>
+          <p:cNvSpPr/>
+          <p:nvPr/>
+        </p:nvSpPr>
+        <p:spPr>
+          <a:xfrm rot="19757080">
+            <a:off x="4031673" y="3321734"/>
+            <a:ext cx="498764" cy="631773"/>
+          </a:xfrm>
+          <a:prstGeom prst="downArrow">
+            <a:avLst/>
+          </a:prstGeom>
+          <a:solidFill>
+            <a:schemeClr val="accent2">
+              <a:lumMod val="75000"/>
+            </a:schemeClr>
+          </a:solidFill>
+          <a:ln>
+            <a:noFill/>
+          </a:ln>
+        </p:spPr>
+        <p:style>
+          <a:lnRef idx="2">
+            <a:schemeClr val="accent1">
+              <a:shade val="50000"/>
+            </a:schemeClr>
+          </a:lnRef>
+          <a:fillRef idx="1">
+            <a:schemeClr val="accent1"/>
+          </a:fillRef>
+          <a:effectRef idx="0">
+            <a:schemeClr val="accent1"/>
+          </a:effectRef>
+          <a:fontRef idx="minor">
+            <a:schemeClr val="lt1"/>
+          </a:fontRef>
+        </p:style>
+        <p:txBody>
+          <a:bodyPr rtlCol="0" anchor="ctr"/>
+          <a:lstStyle/>
+          <a:p>
+            <a:pPr algn="ctr"/>
+            <a:endParaRPr lang="zh-TW" altLang="en-US"/>
+          </a:p>
+        </p:txBody>
+      </p:sp>
+      <p:sp>
+        <p:nvSpPr>
+          <p:cNvPr id="11" name="矩形 10">
+            <a:extLst>
+              <a:ext uri="{FF2B5EF4-FFF2-40B4-BE49-F238E27FC236}">
+                <a16:creationId xmlns:a16="http://schemas.microsoft.com/office/drawing/2014/main" id="{6F652E99-263A-4D97-B66D-1B7039C57BA2}"/>
+              </a:ext>
+            </a:extLst>
+          </p:cNvPr>
+          <p:cNvSpPr/>
+          <p:nvPr/>
+        </p:nvSpPr>
+        <p:spPr>
+          <a:xfrm>
+            <a:off x="7074954" y="5552901"/>
+            <a:ext cx="3016891" cy="864112"/>
+          </a:xfrm>
+          <a:prstGeom prst="rect">
+            <a:avLst/>
+          </a:prstGeom>
+          <a:solidFill>
+            <a:srgbClr val="7030A0"/>
+          </a:solidFill>
+          <a:ln>
+            <a:noFill/>
+          </a:ln>
+        </p:spPr>
+        <p:style>
+          <a:lnRef idx="2">
+            <a:schemeClr val="accent1">
+              <a:shade val="50000"/>
+            </a:schemeClr>
+          </a:lnRef>
+          <a:fillRef idx="1">
+            <a:schemeClr val="accent1"/>
+          </a:fillRef>
+          <a:effectRef idx="0">
+            <a:schemeClr val="accent1"/>
+          </a:effectRef>
+          <a:fontRef idx="minor">
+            <a:schemeClr val="lt1"/>
+          </a:fontRef>
+        </p:style>
+        <p:txBody>
+          <a:bodyPr rtlCol="0" anchor="ctr"/>
+          <a:lstStyle/>
+          <a:p>
+            <a:pPr algn="ctr"/>
+            <a:r>
+              <a:rPr lang="zh-TW" altLang="en-US" sz="2400" dirty="0">
+                <a:latin typeface="Microsoft YaHei" panose="020B0503020204020204" pitchFamily="34" charset="-122"/>
+                <a:ea typeface="Microsoft YaHei" panose="020B0503020204020204" pitchFamily="34" charset="-122"/>
+              </a:rPr>
+              <a:t>深度學習模型</a:t>
+            </a:r>
+          </a:p>
+        </p:txBody>
+      </p:sp>
+      <p:sp>
+        <p:nvSpPr>
+          <p:cNvPr id="12" name="向下箭號 11"/>
+          <p:cNvSpPr/>
+          <p:nvPr/>
+        </p:nvSpPr>
+        <p:spPr>
+          <a:xfrm rot="19757080">
+            <a:off x="6313517" y="4838064"/>
+            <a:ext cx="498764" cy="631773"/>
+          </a:xfrm>
+          <a:prstGeom prst="downArrow">
+            <a:avLst/>
+          </a:prstGeom>
+          <a:solidFill>
+            <a:schemeClr val="accent2">
+              <a:lumMod val="75000"/>
+            </a:schemeClr>
+          </a:solidFill>
+          <a:ln>
+            <a:noFill/>
+          </a:ln>
+        </p:spPr>
+        <p:style>
+          <a:lnRef idx="2">
+            <a:schemeClr val="accent1">
+              <a:shade val="50000"/>
+            </a:schemeClr>
+          </a:lnRef>
+          <a:fillRef idx="1">
+            <a:schemeClr val="accent1"/>
+          </a:fillRef>
+          <a:effectRef idx="0">
+            <a:schemeClr val="accent1"/>
+          </a:effectRef>
+          <a:fontRef idx="minor">
+            <a:schemeClr val="lt1"/>
+          </a:fontRef>
+        </p:style>
+        <p:txBody>
+          <a:bodyPr rtlCol="0" anchor="ctr"/>
+          <a:lstStyle/>
+          <a:p>
+            <a:pPr algn="ctr"/>
+            <a:endParaRPr lang="zh-TW" altLang="en-US"/>
+          </a:p>
+        </p:txBody>
+      </p:sp>
+    </p:spTree>
+    <p:extLst>
+      <p:ext uri="{BB962C8B-B14F-4D97-AF65-F5344CB8AC3E}">
+        <p14:creationId xmlns:p14="http://schemas.microsoft.com/office/powerpoint/2010/main" val="2909761557"/>
+      </p:ext>
+    </p:extLst>
+  </p:cSld>
+  <p:clrMapOvr>
+    <a:masterClrMapping/>
+  </p:clrMapOvr>
+</p:sld>
+</file>
+
+<file path=ppt/slides/slide15.xml><?xml version="1.0" encoding="utf-8"?>
+<p:sld xmlns:a="http://schemas.openxmlformats.org/drawingml/2006/main" xmlns:r="http://schemas.openxmlformats.org/officeDocument/2006/relationships" xmlns:p="http://schemas.openxmlformats.org/presentationml/2006/main">
+  <p:cSld>
+    <p:spTree>
+      <p:nvGrpSpPr>
+        <p:cNvPr id="1" name=""/>
+        <p:cNvGrpSpPr/>
+        <p:nvPr/>
+      </p:nvGrpSpPr>
+      <p:grpSpPr>
+        <a:xfrm>
+          <a:off x="0" y="0"/>
+          <a:ext cx="0" cy="0"/>
+          <a:chOff x="0" y="0"/>
+          <a:chExt cx="0" cy="0"/>
+        </a:xfrm>
+      </p:grpSpPr>
+      <p:sp>
+        <p:nvSpPr>
           <p:cNvPr id="5" name="副標題 2">
             <a:extLst>
               <a:ext uri="{FF2B5EF4-FFF2-40B4-BE49-F238E27FC236}">
@@ -14478,6 +14994,806 @@
     <p:extLst>
       <p:ext uri="{BB962C8B-B14F-4D97-AF65-F5344CB8AC3E}">
         <p14:creationId xmlns:p14="http://schemas.microsoft.com/office/powerpoint/2010/main" val="1211294285"/>
+      </p:ext>
+    </p:extLst>
+  </p:cSld>
+  <p:clrMapOvr>
+    <a:masterClrMapping/>
+  </p:clrMapOvr>
+</p:sld>
+</file>
+
+<file path=ppt/slides/slide16.xml><?xml version="1.0" encoding="utf-8"?>
+<p:sld xmlns:a="http://schemas.openxmlformats.org/drawingml/2006/main" xmlns:r="http://schemas.openxmlformats.org/officeDocument/2006/relationships" xmlns:p="http://schemas.openxmlformats.org/presentationml/2006/main">
+  <p:cSld>
+    <p:spTree>
+      <p:nvGrpSpPr>
+        <p:cNvPr id="1" name=""/>
+        <p:cNvGrpSpPr/>
+        <p:nvPr/>
+      </p:nvGrpSpPr>
+      <p:grpSpPr>
+        <a:xfrm>
+          <a:off x="0" y="0"/>
+          <a:ext cx="0" cy="0"/>
+          <a:chOff x="0" y="0"/>
+          <a:chExt cx="0" cy="0"/>
+        </a:xfrm>
+      </p:grpSpPr>
+      <p:sp>
+        <p:nvSpPr>
+          <p:cNvPr id="2" name="標題 1"/>
+          <p:cNvSpPr>
+            <a:spLocks noGrp="1"/>
+          </p:cNvSpPr>
+          <p:nvPr>
+            <p:ph type="title"/>
+          </p:nvPr>
+        </p:nvSpPr>
+        <p:spPr/>
+        <p:txBody>
+          <a:bodyPr>
+            <a:normAutofit fontScale="90000"/>
+          </a:bodyPr>
+          <a:lstStyle/>
+          <a:p>
+            <a:r>
+              <a:rPr lang="zh-TW" altLang="en-US" dirty="0" smtClean="0"/>
+              <a:t>更多挑戰</a:t>
+            </a:r>
+            <a:endParaRPr lang="zh-TW" altLang="en-US" dirty="0"/>
+          </a:p>
+        </p:txBody>
+      </p:sp>
+      <p:sp>
+        <p:nvSpPr>
+          <p:cNvPr id="4" name="副標題 2">
+            <a:extLst>
+              <a:ext uri="{FF2B5EF4-FFF2-40B4-BE49-F238E27FC236}">
+                <a16:creationId xmlns:a16="http://schemas.microsoft.com/office/drawing/2014/main" id="{F20B3FBE-4A54-43AE-B671-91672BD1F97B}"/>
+              </a:ext>
+            </a:extLst>
+          </p:cNvPr>
+          <p:cNvSpPr txBox="1">
+            <a:spLocks/>
+          </p:cNvSpPr>
+          <p:nvPr/>
+        </p:nvSpPr>
+        <p:spPr>
+          <a:xfrm>
+            <a:off x="1371600" y="832976"/>
+            <a:ext cx="9144000" cy="610039"/>
+          </a:xfrm>
+          <a:prstGeom prst="rect">
+            <a:avLst/>
+          </a:prstGeom>
+        </p:spPr>
+        <p:txBody>
+          <a:bodyPr vert="horz" lIns="91440" tIns="45720" rIns="91440" bIns="45720" rtlCol="0">
+            <a:normAutofit/>
+          </a:bodyPr>
+          <a:lstStyle>
+            <a:lvl1pPr marL="228600" indent="-228600" algn="l" defTabSz="914400" rtl="0" eaLnBrk="1" latinLnBrk="0" hangingPunct="1">
+              <a:lnSpc>
+                <a:spcPct val="90000"/>
+              </a:lnSpc>
+              <a:spcBef>
+                <a:spcPts val="1000"/>
+              </a:spcBef>
+              <a:buFont typeface="Arial" panose="020B0604020202020204" pitchFamily="34" charset="0"/>
+              <a:buChar char="•"/>
+              <a:defRPr sz="2800" kern="1200">
+                <a:solidFill>
+                  <a:schemeClr val="tx1"/>
+                </a:solidFill>
+                <a:latin typeface="+mn-lt"/>
+                <a:ea typeface="+mn-ea"/>
+                <a:cs typeface="+mn-cs"/>
+              </a:defRPr>
+            </a:lvl1pPr>
+            <a:lvl2pPr marL="685800" indent="-228600" algn="l" defTabSz="914400" rtl="0" eaLnBrk="1" latinLnBrk="0" hangingPunct="1">
+              <a:lnSpc>
+                <a:spcPct val="90000"/>
+              </a:lnSpc>
+              <a:spcBef>
+                <a:spcPts val="500"/>
+              </a:spcBef>
+              <a:buFont typeface="Arial" panose="020B0604020202020204" pitchFamily="34" charset="0"/>
+              <a:buChar char="•"/>
+              <a:defRPr sz="2400" kern="1200">
+                <a:solidFill>
+                  <a:schemeClr val="tx1"/>
+                </a:solidFill>
+                <a:latin typeface="+mn-lt"/>
+                <a:ea typeface="+mn-ea"/>
+                <a:cs typeface="+mn-cs"/>
+              </a:defRPr>
+            </a:lvl2pPr>
+            <a:lvl3pPr marL="1143000" indent="-228600" algn="l" defTabSz="914400" rtl="0" eaLnBrk="1" latinLnBrk="0" hangingPunct="1">
+              <a:lnSpc>
+                <a:spcPct val="90000"/>
+              </a:lnSpc>
+              <a:spcBef>
+                <a:spcPts val="500"/>
+              </a:spcBef>
+              <a:buFont typeface="Arial" panose="020B0604020202020204" pitchFamily="34" charset="0"/>
+              <a:buChar char="•"/>
+              <a:defRPr sz="2000" kern="1200">
+                <a:solidFill>
+                  <a:schemeClr val="tx1"/>
+                </a:solidFill>
+                <a:latin typeface="+mn-lt"/>
+                <a:ea typeface="+mn-ea"/>
+                <a:cs typeface="+mn-cs"/>
+              </a:defRPr>
+            </a:lvl3pPr>
+            <a:lvl4pPr marL="1600200" indent="-228600" algn="l" defTabSz="914400" rtl="0" eaLnBrk="1" latinLnBrk="0" hangingPunct="1">
+              <a:lnSpc>
+                <a:spcPct val="90000"/>
+              </a:lnSpc>
+              <a:spcBef>
+                <a:spcPts val="500"/>
+              </a:spcBef>
+              <a:buFont typeface="Arial" panose="020B0604020202020204" pitchFamily="34" charset="0"/>
+              <a:buChar char="•"/>
+              <a:defRPr sz="1800" kern="1200">
+                <a:solidFill>
+                  <a:schemeClr val="tx1"/>
+                </a:solidFill>
+                <a:latin typeface="+mn-lt"/>
+                <a:ea typeface="+mn-ea"/>
+                <a:cs typeface="+mn-cs"/>
+              </a:defRPr>
+            </a:lvl4pPr>
+            <a:lvl5pPr marL="2057400" indent="-228600" algn="l" defTabSz="914400" rtl="0" eaLnBrk="1" latinLnBrk="0" hangingPunct="1">
+              <a:lnSpc>
+                <a:spcPct val="90000"/>
+              </a:lnSpc>
+              <a:spcBef>
+                <a:spcPts val="500"/>
+              </a:spcBef>
+              <a:buFont typeface="Arial" panose="020B0604020202020204" pitchFamily="34" charset="0"/>
+              <a:buChar char="•"/>
+              <a:defRPr sz="1800" kern="1200">
+                <a:solidFill>
+                  <a:schemeClr val="tx1"/>
+                </a:solidFill>
+                <a:latin typeface="+mn-lt"/>
+                <a:ea typeface="+mn-ea"/>
+                <a:cs typeface="+mn-cs"/>
+              </a:defRPr>
+            </a:lvl5pPr>
+            <a:lvl6pPr marL="2514600" indent="-228600" algn="l" defTabSz="914400" rtl="0" eaLnBrk="1" latinLnBrk="0" hangingPunct="1">
+              <a:lnSpc>
+                <a:spcPct val="90000"/>
+              </a:lnSpc>
+              <a:spcBef>
+                <a:spcPts val="500"/>
+              </a:spcBef>
+              <a:buFont typeface="Arial" panose="020B0604020202020204" pitchFamily="34" charset="0"/>
+              <a:buChar char="•"/>
+              <a:defRPr sz="1800" kern="1200">
+                <a:solidFill>
+                  <a:schemeClr val="tx1"/>
+                </a:solidFill>
+                <a:latin typeface="+mn-lt"/>
+                <a:ea typeface="+mn-ea"/>
+                <a:cs typeface="+mn-cs"/>
+              </a:defRPr>
+            </a:lvl6pPr>
+            <a:lvl7pPr marL="2971800" indent="-228600" algn="l" defTabSz="914400" rtl="0" eaLnBrk="1" latinLnBrk="0" hangingPunct="1">
+              <a:lnSpc>
+                <a:spcPct val="90000"/>
+              </a:lnSpc>
+              <a:spcBef>
+                <a:spcPts val="500"/>
+              </a:spcBef>
+              <a:buFont typeface="Arial" panose="020B0604020202020204" pitchFamily="34" charset="0"/>
+              <a:buChar char="•"/>
+              <a:defRPr sz="1800" kern="1200">
+                <a:solidFill>
+                  <a:schemeClr val="tx1"/>
+                </a:solidFill>
+                <a:latin typeface="+mn-lt"/>
+                <a:ea typeface="+mn-ea"/>
+                <a:cs typeface="+mn-cs"/>
+              </a:defRPr>
+            </a:lvl7pPr>
+            <a:lvl8pPr marL="3429000" indent="-228600" algn="l" defTabSz="914400" rtl="0" eaLnBrk="1" latinLnBrk="0" hangingPunct="1">
+              <a:lnSpc>
+                <a:spcPct val="90000"/>
+              </a:lnSpc>
+              <a:spcBef>
+                <a:spcPts val="500"/>
+              </a:spcBef>
+              <a:buFont typeface="Arial" panose="020B0604020202020204" pitchFamily="34" charset="0"/>
+              <a:buChar char="•"/>
+              <a:defRPr sz="1800" kern="1200">
+                <a:solidFill>
+                  <a:schemeClr val="tx1"/>
+                </a:solidFill>
+                <a:latin typeface="+mn-lt"/>
+                <a:ea typeface="+mn-ea"/>
+                <a:cs typeface="+mn-cs"/>
+              </a:defRPr>
+            </a:lvl8pPr>
+            <a:lvl9pPr marL="3886200" indent="-228600" algn="l" defTabSz="914400" rtl="0" eaLnBrk="1" latinLnBrk="0" hangingPunct="1">
+              <a:lnSpc>
+                <a:spcPct val="90000"/>
+              </a:lnSpc>
+              <a:spcBef>
+                <a:spcPts val="500"/>
+              </a:spcBef>
+              <a:buFont typeface="Arial" panose="020B0604020202020204" pitchFamily="34" charset="0"/>
+              <a:buChar char="•"/>
+              <a:defRPr sz="1800" kern="1200">
+                <a:solidFill>
+                  <a:schemeClr val="tx1"/>
+                </a:solidFill>
+                <a:latin typeface="+mn-lt"/>
+                <a:ea typeface="+mn-ea"/>
+                <a:cs typeface="+mn-cs"/>
+              </a:defRPr>
+            </a:lvl9pPr>
+          </a:lstStyle>
+          <a:p>
+            <a:pPr marL="0" indent="0">
+              <a:buNone/>
+            </a:pPr>
+            <a:r>
+              <a:rPr lang="en-US" altLang="zh-TW" dirty="0" smtClean="0">
+                <a:solidFill>
+                  <a:schemeClr val="bg1"/>
+                </a:solidFill>
+                <a:latin typeface="Microsoft YaHei" panose="020B0503020204020204" pitchFamily="34" charset="-122"/>
+                <a:ea typeface="Microsoft YaHei" panose="020B0503020204020204" pitchFamily="34" charset="-122"/>
+              </a:rPr>
+              <a:t>Regression </a:t>
+            </a:r>
+            <a:r>
+              <a:rPr lang="zh-TW" altLang="en-US" dirty="0" smtClean="0">
+                <a:solidFill>
+                  <a:schemeClr val="bg1"/>
+                </a:solidFill>
+                <a:latin typeface="Microsoft YaHei" panose="020B0503020204020204" pitchFamily="34" charset="-122"/>
+                <a:ea typeface="Microsoft YaHei" panose="020B0503020204020204" pitchFamily="34" charset="-122"/>
+              </a:rPr>
+              <a:t>預測氣溫</a:t>
+            </a:r>
+            <a:endParaRPr lang="zh-TW" altLang="en-US" dirty="0">
+              <a:solidFill>
+                <a:schemeClr val="bg1"/>
+              </a:solidFill>
+              <a:latin typeface="Microsoft YaHei" panose="020B0503020204020204" pitchFamily="34" charset="-122"/>
+              <a:ea typeface="Microsoft YaHei" panose="020B0503020204020204" pitchFamily="34" charset="-122"/>
+            </a:endParaRPr>
+          </a:p>
+        </p:txBody>
+      </p:sp>
+      <p:sp>
+        <p:nvSpPr>
+          <p:cNvPr id="6" name="矩形 5"/>
+          <p:cNvSpPr/>
+          <p:nvPr/>
+        </p:nvSpPr>
+        <p:spPr>
+          <a:xfrm>
+            <a:off x="5411209" y="739834"/>
+            <a:ext cx="4641273" cy="523220"/>
+          </a:xfrm>
+          <a:prstGeom prst="rect">
+            <a:avLst/>
+          </a:prstGeom>
+        </p:spPr>
+        <p:txBody>
+          <a:bodyPr wrap="square">
+            <a:spAutoFit/>
+          </a:bodyPr>
+          <a:lstStyle/>
+          <a:p>
+            <a:r>
+              <a:rPr lang="en-US" altLang="zh-TW" sz="2800" dirty="0" smtClean="0">
+                <a:hlinkClick r:id="rId2"/>
+              </a:rPr>
+              <a:t>AIWorkshop0405</a:t>
+            </a:r>
+            <a:endParaRPr lang="en-US" altLang="zh-TW" sz="2800" dirty="0"/>
+          </a:p>
+        </p:txBody>
+      </p:sp>
+      <p:cxnSp>
+        <p:nvCxnSpPr>
+          <p:cNvPr id="9" name="直線箭頭接點 4">
+            <a:extLst>
+              <a:ext uri="{FF2B5EF4-FFF2-40B4-BE49-F238E27FC236}">
+                <a16:creationId xmlns:a16="http://schemas.microsoft.com/office/drawing/2014/main" id="{093F02F5-921D-459F-9332-F1E6E9E3DDBB}"/>
+              </a:ext>
+            </a:extLst>
+          </p:cNvPr>
+          <p:cNvCxnSpPr>
+            <a:cxnSpLocks/>
+            <a:stCxn id="10" idx="6"/>
+            <a:endCxn id="13" idx="1"/>
+          </p:cNvCxnSpPr>
+          <p:nvPr/>
+        </p:nvCxnSpPr>
+        <p:spPr>
+          <a:xfrm>
+            <a:off x="2190414" y="2072708"/>
+            <a:ext cx="2083151" cy="1707608"/>
+          </a:xfrm>
+          <a:prstGeom prst="straightConnector1">
+            <a:avLst/>
+          </a:prstGeom>
+          <a:ln w="38100">
+            <a:tailEnd type="triangle"/>
+          </a:ln>
+        </p:spPr>
+        <p:style>
+          <a:lnRef idx="1">
+            <a:schemeClr val="accent1"/>
+          </a:lnRef>
+          <a:fillRef idx="0">
+            <a:schemeClr val="accent1"/>
+          </a:fillRef>
+          <a:effectRef idx="0">
+            <a:schemeClr val="accent1"/>
+          </a:effectRef>
+          <a:fontRef idx="minor">
+            <a:schemeClr val="tx1"/>
+          </a:fontRef>
+        </p:style>
+      </p:cxnSp>
+      <p:sp>
+        <p:nvSpPr>
+          <p:cNvPr id="10" name="橢圓 9">
+            <a:extLst>
+              <a:ext uri="{FF2B5EF4-FFF2-40B4-BE49-F238E27FC236}">
+                <a16:creationId xmlns:a16="http://schemas.microsoft.com/office/drawing/2014/main" id="{7402684B-301C-4A47-AB7C-180163A084F6}"/>
+              </a:ext>
+            </a:extLst>
+          </p:cNvPr>
+          <p:cNvSpPr/>
+          <p:nvPr/>
+        </p:nvSpPr>
+        <p:spPr>
+          <a:xfrm>
+            <a:off x="572630" y="1622460"/>
+            <a:ext cx="1617784" cy="900496"/>
+          </a:xfrm>
+          <a:prstGeom prst="ellipse">
+            <a:avLst/>
+          </a:prstGeom>
+          <a:solidFill>
+            <a:schemeClr val="accent4">
+              <a:lumMod val="75000"/>
+            </a:schemeClr>
+          </a:solidFill>
+          <a:ln>
+            <a:noFill/>
+          </a:ln>
+        </p:spPr>
+        <p:style>
+          <a:lnRef idx="2">
+            <a:schemeClr val="accent1">
+              <a:shade val="50000"/>
+            </a:schemeClr>
+          </a:lnRef>
+          <a:fillRef idx="1">
+            <a:schemeClr val="accent1"/>
+          </a:fillRef>
+          <a:effectRef idx="0">
+            <a:schemeClr val="accent1"/>
+          </a:effectRef>
+          <a:fontRef idx="minor">
+            <a:schemeClr val="lt1"/>
+          </a:fontRef>
+        </p:style>
+        <p:txBody>
+          <a:bodyPr rtlCol="0" anchor="ctr"/>
+          <a:lstStyle/>
+          <a:p>
+            <a:pPr algn="ctr"/>
+            <a:r>
+              <a:rPr kumimoji="1" lang="zh-TW" altLang="en-US" sz="2400" dirty="0">
+                <a:latin typeface="Microsoft YaHei" panose="020B0503020204020204" pitchFamily="34" charset="-122"/>
+                <a:ea typeface="Microsoft YaHei" panose="020B0503020204020204" pitchFamily="34" charset="-122"/>
+              </a:rPr>
+              <a:t>氣壓</a:t>
+            </a:r>
+          </a:p>
+        </p:txBody>
+      </p:sp>
+      <p:cxnSp>
+        <p:nvCxnSpPr>
+          <p:cNvPr id="11" name="直線箭頭接點 14">
+            <a:extLst>
+              <a:ext uri="{FF2B5EF4-FFF2-40B4-BE49-F238E27FC236}">
+                <a16:creationId xmlns:a16="http://schemas.microsoft.com/office/drawing/2014/main" id="{75D7B18E-9E6A-4FC5-8F13-4498606D01FE}"/>
+              </a:ext>
+            </a:extLst>
+          </p:cNvPr>
+          <p:cNvCxnSpPr>
+            <a:cxnSpLocks/>
+            <a:stCxn id="13" idx="3"/>
+            <a:endCxn id="12" idx="2"/>
+          </p:cNvCxnSpPr>
+          <p:nvPr/>
+        </p:nvCxnSpPr>
+        <p:spPr>
+          <a:xfrm flipV="1">
+            <a:off x="7290456" y="3780315"/>
+            <a:ext cx="1328522" cy="1"/>
+          </a:xfrm>
+          <a:prstGeom prst="straightConnector1">
+            <a:avLst/>
+          </a:prstGeom>
+          <a:ln w="38100">
+            <a:tailEnd type="triangle"/>
+          </a:ln>
+        </p:spPr>
+        <p:style>
+          <a:lnRef idx="1">
+            <a:schemeClr val="accent1"/>
+          </a:lnRef>
+          <a:fillRef idx="0">
+            <a:schemeClr val="accent1"/>
+          </a:fillRef>
+          <a:effectRef idx="0">
+            <a:schemeClr val="accent1"/>
+          </a:effectRef>
+          <a:fontRef idx="minor">
+            <a:schemeClr val="tx1"/>
+          </a:fontRef>
+        </p:style>
+      </p:cxnSp>
+      <p:sp>
+        <p:nvSpPr>
+          <p:cNvPr id="12" name="橢圓 11">
+            <a:extLst>
+              <a:ext uri="{FF2B5EF4-FFF2-40B4-BE49-F238E27FC236}">
+                <a16:creationId xmlns:a16="http://schemas.microsoft.com/office/drawing/2014/main" id="{D4D261BA-BBDA-483F-913B-E15705DCA9A5}"/>
+              </a:ext>
+            </a:extLst>
+          </p:cNvPr>
+          <p:cNvSpPr/>
+          <p:nvPr/>
+        </p:nvSpPr>
+        <p:spPr>
+          <a:xfrm>
+            <a:off x="8618978" y="3330067"/>
+            <a:ext cx="2656655" cy="900496"/>
+          </a:xfrm>
+          <a:prstGeom prst="ellipse">
+            <a:avLst/>
+          </a:prstGeom>
+          <a:solidFill>
+            <a:schemeClr val="accent2">
+              <a:lumMod val="60000"/>
+              <a:lumOff val="40000"/>
+            </a:schemeClr>
+          </a:solidFill>
+          <a:ln>
+            <a:noFill/>
+          </a:ln>
+        </p:spPr>
+        <p:style>
+          <a:lnRef idx="2">
+            <a:schemeClr val="accent1">
+              <a:shade val="50000"/>
+            </a:schemeClr>
+          </a:lnRef>
+          <a:fillRef idx="1">
+            <a:schemeClr val="accent1"/>
+          </a:fillRef>
+          <a:effectRef idx="0">
+            <a:schemeClr val="accent1"/>
+          </a:effectRef>
+          <a:fontRef idx="minor">
+            <a:schemeClr val="lt1"/>
+          </a:fontRef>
+        </p:style>
+        <p:txBody>
+          <a:bodyPr rtlCol="0" anchor="ctr"/>
+          <a:lstStyle/>
+          <a:p>
+            <a:pPr algn="ctr"/>
+            <a:r>
+              <a:rPr kumimoji="1" lang="zh-TW" altLang="en-US" sz="2400" dirty="0" smtClean="0">
+                <a:solidFill>
+                  <a:schemeClr val="tx1"/>
+                </a:solidFill>
+                <a:latin typeface="Microsoft YaHei" panose="020B0503020204020204" pitchFamily="34" charset="-122"/>
+                <a:ea typeface="Microsoft YaHei" panose="020B0503020204020204" pitchFamily="34" charset="-122"/>
+              </a:rPr>
+              <a:t>氣溫</a:t>
+            </a:r>
+            <a:endParaRPr kumimoji="1" lang="zh-TW" altLang="en-US" sz="2400" dirty="0">
+              <a:solidFill>
+                <a:schemeClr val="tx1"/>
+              </a:solidFill>
+              <a:latin typeface="Microsoft YaHei" panose="020B0503020204020204" pitchFamily="34" charset="-122"/>
+              <a:ea typeface="Microsoft YaHei" panose="020B0503020204020204" pitchFamily="34" charset="-122"/>
+            </a:endParaRPr>
+          </a:p>
+        </p:txBody>
+      </p:sp>
+      <p:sp>
+        <p:nvSpPr>
+          <p:cNvPr id="13" name="矩形 12">
+            <a:extLst>
+              <a:ext uri="{FF2B5EF4-FFF2-40B4-BE49-F238E27FC236}">
+                <a16:creationId xmlns:a16="http://schemas.microsoft.com/office/drawing/2014/main" id="{6F652E99-263A-4D97-B66D-1B7039C57BA2}"/>
+              </a:ext>
+            </a:extLst>
+          </p:cNvPr>
+          <p:cNvSpPr/>
+          <p:nvPr/>
+        </p:nvSpPr>
+        <p:spPr>
+          <a:xfrm>
+            <a:off x="4273565" y="2897603"/>
+            <a:ext cx="3016891" cy="1765425"/>
+          </a:xfrm>
+          <a:prstGeom prst="rect">
+            <a:avLst/>
+          </a:prstGeom>
+          <a:solidFill>
+            <a:srgbClr val="7030A0"/>
+          </a:solidFill>
+          <a:ln>
+            <a:noFill/>
+          </a:ln>
+        </p:spPr>
+        <p:style>
+          <a:lnRef idx="2">
+            <a:schemeClr val="accent1">
+              <a:shade val="50000"/>
+            </a:schemeClr>
+          </a:lnRef>
+          <a:fillRef idx="1">
+            <a:schemeClr val="accent1"/>
+          </a:fillRef>
+          <a:effectRef idx="0">
+            <a:schemeClr val="accent1"/>
+          </a:effectRef>
+          <a:fontRef idx="minor">
+            <a:schemeClr val="lt1"/>
+          </a:fontRef>
+        </p:style>
+        <p:txBody>
+          <a:bodyPr rtlCol="0" anchor="ctr"/>
+          <a:lstStyle/>
+          <a:p>
+            <a:pPr algn="ctr"/>
+            <a:r>
+              <a:rPr lang="zh-TW" altLang="en-US" sz="2400" dirty="0">
+                <a:latin typeface="Microsoft YaHei" panose="020B0503020204020204" pitchFamily="34" charset="-122"/>
+                <a:ea typeface="Microsoft YaHei" panose="020B0503020204020204" pitchFamily="34" charset="-122"/>
+              </a:rPr>
+              <a:t>深度學習模型</a:t>
+            </a:r>
+          </a:p>
+        </p:txBody>
+      </p:sp>
+      <p:sp>
+        <p:nvSpPr>
+          <p:cNvPr id="14" name="橢圓 13">
+            <a:extLst>
+              <a:ext uri="{FF2B5EF4-FFF2-40B4-BE49-F238E27FC236}">
+                <a16:creationId xmlns:a16="http://schemas.microsoft.com/office/drawing/2014/main" id="{22E9DA82-5D57-4CBB-AC4A-6CFAA3B8AECA}"/>
+              </a:ext>
+            </a:extLst>
+          </p:cNvPr>
+          <p:cNvSpPr/>
+          <p:nvPr/>
+        </p:nvSpPr>
+        <p:spPr>
+          <a:xfrm>
+            <a:off x="462479" y="3495019"/>
+            <a:ext cx="1617784" cy="900496"/>
+          </a:xfrm>
+          <a:prstGeom prst="ellipse">
+            <a:avLst/>
+          </a:prstGeom>
+          <a:solidFill>
+            <a:schemeClr val="accent4">
+              <a:lumMod val="75000"/>
+            </a:schemeClr>
+          </a:solidFill>
+          <a:ln>
+            <a:noFill/>
+          </a:ln>
+        </p:spPr>
+        <p:style>
+          <a:lnRef idx="2">
+            <a:schemeClr val="accent1">
+              <a:shade val="50000"/>
+            </a:schemeClr>
+          </a:lnRef>
+          <a:fillRef idx="1">
+            <a:schemeClr val="accent1"/>
+          </a:fillRef>
+          <a:effectRef idx="0">
+            <a:schemeClr val="accent1"/>
+          </a:effectRef>
+          <a:fontRef idx="minor">
+            <a:schemeClr val="lt1"/>
+          </a:fontRef>
+        </p:style>
+        <p:txBody>
+          <a:bodyPr rtlCol="0" anchor="ctr"/>
+          <a:lstStyle/>
+          <a:p>
+            <a:pPr algn="ctr"/>
+            <a:r>
+              <a:rPr kumimoji="1" lang="zh-TW" altLang="en-US" sz="2400" dirty="0">
+                <a:latin typeface="Microsoft YaHei" panose="020B0503020204020204" pitchFamily="34" charset="-122"/>
+                <a:ea typeface="Microsoft YaHei" panose="020B0503020204020204" pitchFamily="34" charset="-122"/>
+              </a:rPr>
+              <a:t>濕度</a:t>
+            </a:r>
+            <a:endParaRPr kumimoji="1" lang="zh-TW" altLang="en-US" sz="2400" dirty="0">
+              <a:latin typeface="Microsoft YaHei" panose="020B0503020204020204" pitchFamily="34" charset="-122"/>
+              <a:ea typeface="Microsoft YaHei" panose="020B0503020204020204" pitchFamily="34" charset="-122"/>
+            </a:endParaRPr>
+          </a:p>
+        </p:txBody>
+      </p:sp>
+      <p:sp>
+        <p:nvSpPr>
+          <p:cNvPr id="15" name="橢圓 14">
+            <a:extLst>
+              <a:ext uri="{FF2B5EF4-FFF2-40B4-BE49-F238E27FC236}">
+                <a16:creationId xmlns:a16="http://schemas.microsoft.com/office/drawing/2014/main" id="{2E431F5B-5671-43AE-812C-F5685B3F1983}"/>
+              </a:ext>
+            </a:extLst>
+          </p:cNvPr>
+          <p:cNvSpPr/>
+          <p:nvPr/>
+        </p:nvSpPr>
+        <p:spPr>
+          <a:xfrm>
+            <a:off x="462479" y="5367578"/>
+            <a:ext cx="1617784" cy="900496"/>
+          </a:xfrm>
+          <a:prstGeom prst="ellipse">
+            <a:avLst/>
+          </a:prstGeom>
+          <a:solidFill>
+            <a:schemeClr val="accent4">
+              <a:lumMod val="75000"/>
+            </a:schemeClr>
+          </a:solidFill>
+          <a:ln>
+            <a:noFill/>
+          </a:ln>
+        </p:spPr>
+        <p:style>
+          <a:lnRef idx="2">
+            <a:schemeClr val="accent1">
+              <a:shade val="50000"/>
+            </a:schemeClr>
+          </a:lnRef>
+          <a:fillRef idx="1">
+            <a:schemeClr val="accent1"/>
+          </a:fillRef>
+          <a:effectRef idx="0">
+            <a:schemeClr val="accent1"/>
+          </a:effectRef>
+          <a:fontRef idx="minor">
+            <a:schemeClr val="lt1"/>
+          </a:fontRef>
+        </p:style>
+        <p:txBody>
+          <a:bodyPr rtlCol="0" anchor="ctr"/>
+          <a:lstStyle/>
+          <a:p>
+            <a:pPr algn="ctr"/>
+            <a:r>
+              <a:rPr kumimoji="1" lang="en-US" altLang="zh-TW" sz="2400" dirty="0">
+                <a:latin typeface="Microsoft YaHei" panose="020B0503020204020204" pitchFamily="34" charset="-122"/>
+                <a:ea typeface="Microsoft YaHei" panose="020B0503020204020204" pitchFamily="34" charset="-122"/>
+              </a:rPr>
+              <a:t>…</a:t>
+            </a:r>
+            <a:endParaRPr kumimoji="1" lang="zh-TW" altLang="en-US" sz="2400" dirty="0">
+              <a:latin typeface="Microsoft YaHei" panose="020B0503020204020204" pitchFamily="34" charset="-122"/>
+              <a:ea typeface="Microsoft YaHei" panose="020B0503020204020204" pitchFamily="34" charset="-122"/>
+            </a:endParaRPr>
+          </a:p>
+        </p:txBody>
+      </p:sp>
+      <p:cxnSp>
+        <p:nvCxnSpPr>
+          <p:cNvPr id="16" name="直線箭頭接點 4">
+            <a:extLst>
+              <a:ext uri="{FF2B5EF4-FFF2-40B4-BE49-F238E27FC236}">
+                <a16:creationId xmlns:a16="http://schemas.microsoft.com/office/drawing/2014/main" id="{59147BB9-E161-413A-8824-702955589A22}"/>
+              </a:ext>
+            </a:extLst>
+          </p:cNvPr>
+          <p:cNvCxnSpPr>
+            <a:cxnSpLocks/>
+            <a:stCxn id="14" idx="6"/>
+            <a:endCxn id="13" idx="1"/>
+          </p:cNvCxnSpPr>
+          <p:nvPr/>
+        </p:nvCxnSpPr>
+        <p:spPr>
+          <a:xfrm flipV="1">
+            <a:off x="2080263" y="3780316"/>
+            <a:ext cx="2193302" cy="164951"/>
+          </a:xfrm>
+          <a:prstGeom prst="straightConnector1">
+            <a:avLst/>
+          </a:prstGeom>
+          <a:ln w="38100">
+            <a:tailEnd type="triangle"/>
+          </a:ln>
+        </p:spPr>
+        <p:style>
+          <a:lnRef idx="1">
+            <a:schemeClr val="accent1"/>
+          </a:lnRef>
+          <a:fillRef idx="0">
+            <a:schemeClr val="accent1"/>
+          </a:fillRef>
+          <a:effectRef idx="0">
+            <a:schemeClr val="accent1"/>
+          </a:effectRef>
+          <a:fontRef idx="minor">
+            <a:schemeClr val="tx1"/>
+          </a:fontRef>
+        </p:style>
+      </p:cxnSp>
+      <p:cxnSp>
+        <p:nvCxnSpPr>
+          <p:cNvPr id="17" name="直線箭頭接點 4">
+            <a:extLst>
+              <a:ext uri="{FF2B5EF4-FFF2-40B4-BE49-F238E27FC236}">
+                <a16:creationId xmlns:a16="http://schemas.microsoft.com/office/drawing/2014/main" id="{12A38E87-D21B-40EA-AE69-0774266CD119}"/>
+              </a:ext>
+            </a:extLst>
+          </p:cNvPr>
+          <p:cNvCxnSpPr>
+            <a:cxnSpLocks/>
+            <a:stCxn id="15" idx="6"/>
+            <a:endCxn id="13" idx="1"/>
+          </p:cNvCxnSpPr>
+          <p:nvPr/>
+        </p:nvCxnSpPr>
+        <p:spPr>
+          <a:xfrm flipV="1">
+            <a:off x="2080263" y="3780316"/>
+            <a:ext cx="2193302" cy="2037510"/>
+          </a:xfrm>
+          <a:prstGeom prst="straightConnector1">
+            <a:avLst/>
+          </a:prstGeom>
+          <a:ln w="38100">
+            <a:tailEnd type="triangle"/>
+          </a:ln>
+        </p:spPr>
+        <p:style>
+          <a:lnRef idx="1">
+            <a:schemeClr val="accent1"/>
+          </a:lnRef>
+          <a:fillRef idx="0">
+            <a:schemeClr val="accent1"/>
+          </a:fillRef>
+          <a:effectRef idx="0">
+            <a:schemeClr val="accent1"/>
+          </a:effectRef>
+          <a:fontRef idx="minor">
+            <a:schemeClr val="tx1"/>
+          </a:fontRef>
+        </p:style>
+      </p:cxnSp>
+    </p:spTree>
+    <p:extLst>
+      <p:ext uri="{BB962C8B-B14F-4D97-AF65-F5344CB8AC3E}">
+        <p14:creationId xmlns:p14="http://schemas.microsoft.com/office/powerpoint/2010/main" val="12850289"/>
       </p:ext>
     </p:extLst>
   </p:cSld>

</xml_diff>